<commit_message>
Updated versions based on review comments
</commit_message>
<xml_diff>
--- a/documentation/SupportingDocuments/CAMARA Meta-release Fall24.pptx
+++ b/documentation/SupportingDocuments/CAMARA Meta-release Fall24.pptx
@@ -269,7 +269,6 @@
 <p1510:revInfo xmlns:a="http://schemas.openxmlformats.org/drawingml/2006/main" xmlns:r="http://schemas.openxmlformats.org/officeDocument/2006/relationships" xmlns:p1510="http://schemas.microsoft.com/office/powerpoint/2015/10/main">
   <p1510:revLst>
     <p1510:client id="{9610C173-2D3E-D34C-812C-51ABDB2614AF}" v="1843" dt="2024-09-11T19:00:20.238"/>
-    <p1510:client id="{C636F9A2-C84B-431D-8EC8-3C52440F1908}" v="9" dt="2024-09-11T12:35:55.934"/>
   </p1510:revLst>
 </p1510:revInfo>
 </file>
@@ -279,7 +278,7 @@
   <pc:docChgLst>
     <pc:chgData name="Damker, Herbert" userId="37ff36be-0e4d-42c3-ac06-7b904f0f6b24" providerId="ADAL" clId="{9610C173-2D3E-D34C-812C-51ABDB2614AF}"/>
     <pc:docChg chg="undo custSel addSld delSld modSld sldOrd modSection">
-      <pc:chgData name="Damker, Herbert" userId="37ff36be-0e4d-42c3-ac06-7b904f0f6b24" providerId="ADAL" clId="{9610C173-2D3E-D34C-812C-51ABDB2614AF}" dt="2024-09-12T12:02:05.015" v="2563" actId="20577"/>
+      <pc:chgData name="Damker, Herbert" userId="37ff36be-0e4d-42c3-ac06-7b904f0f6b24" providerId="ADAL" clId="{9610C173-2D3E-D34C-812C-51ABDB2614AF}" dt="2024-09-12T16:14:58.463" v="2664" actId="20577"/>
       <pc:docMkLst>
         <pc:docMk/>
       </pc:docMkLst>
@@ -705,11 +704,27 @@
         </pc:spChg>
       </pc:sldChg>
       <pc:sldChg chg="modSp mod">
-        <pc:chgData name="Damker, Herbert" userId="37ff36be-0e4d-42c3-ac06-7b904f0f6b24" providerId="ADAL" clId="{9610C173-2D3E-D34C-812C-51ABDB2614AF}" dt="2024-09-11T16:58:35.971" v="2026" actId="790"/>
+        <pc:chgData name="Damker, Herbert" userId="37ff36be-0e4d-42c3-ac06-7b904f0f6b24" providerId="ADAL" clId="{9610C173-2D3E-D34C-812C-51ABDB2614AF}" dt="2024-09-12T16:12:09.129" v="2657" actId="20577"/>
         <pc:sldMkLst>
           <pc:docMk/>
           <pc:sldMk cId="3521829536" sldId="2047"/>
         </pc:sldMkLst>
+        <pc:spChg chg="mod">
+          <ac:chgData name="Damker, Herbert" userId="37ff36be-0e4d-42c3-ac06-7b904f0f6b24" providerId="ADAL" clId="{9610C173-2D3E-D34C-812C-51ABDB2614AF}" dt="2024-09-12T16:11:10.987" v="2639" actId="20577"/>
+          <ac:spMkLst>
+            <pc:docMk/>
+            <pc:sldMk cId="3521829536" sldId="2047"/>
+            <ac:spMk id="24" creationId="{457FB6AF-23BA-4E2A-3205-41696333795B}"/>
+          </ac:spMkLst>
+        </pc:spChg>
+        <pc:spChg chg="mod">
+          <ac:chgData name="Damker, Herbert" userId="37ff36be-0e4d-42c3-ac06-7b904f0f6b24" providerId="ADAL" clId="{9610C173-2D3E-D34C-812C-51ABDB2614AF}" dt="2024-09-12T16:11:18.336" v="2641" actId="20577"/>
+          <ac:spMkLst>
+            <pc:docMk/>
+            <pc:sldMk cId="3521829536" sldId="2047"/>
+            <ac:spMk id="25" creationId="{57470043-71CC-3149-A9FB-2552870F7428}"/>
+          </ac:spMkLst>
+        </pc:spChg>
         <pc:spChg chg="mod">
           <ac:chgData name="Damker, Herbert" userId="37ff36be-0e4d-42c3-ac06-7b904f0f6b24" providerId="ADAL" clId="{9610C173-2D3E-D34C-812C-51ABDB2614AF}" dt="2024-09-11T16:58:20.026" v="2025" actId="27636"/>
           <ac:spMkLst>
@@ -727,7 +742,71 @@
           </ac:spMkLst>
         </pc:spChg>
         <pc:spChg chg="mod">
-          <ac:chgData name="Damker, Herbert" userId="37ff36be-0e4d-42c3-ac06-7b904f0f6b24" providerId="ADAL" clId="{9610C173-2D3E-D34C-812C-51ABDB2614AF}" dt="2024-09-11T16:57:38.207" v="2007" actId="20577"/>
+          <ac:chgData name="Damker, Herbert" userId="37ff36be-0e4d-42c3-ac06-7b904f0f6b24" providerId="ADAL" clId="{9610C173-2D3E-D34C-812C-51ABDB2614AF}" dt="2024-09-12T16:11:25.686" v="2643" actId="20577"/>
+          <ac:spMkLst>
+            <pc:docMk/>
+            <pc:sldMk cId="3521829536" sldId="2047"/>
+            <ac:spMk id="29" creationId="{1EBFE74D-5D26-51EA-D7B0-48CA02E879CC}"/>
+          </ac:spMkLst>
+        </pc:spChg>
+        <pc:spChg chg="mod">
+          <ac:chgData name="Damker, Herbert" userId="37ff36be-0e4d-42c3-ac06-7b904f0f6b24" providerId="ADAL" clId="{9610C173-2D3E-D34C-812C-51ABDB2614AF}" dt="2024-09-12T16:11:01.672" v="2637" actId="20577"/>
+          <ac:spMkLst>
+            <pc:docMk/>
+            <pc:sldMk cId="3521829536" sldId="2047"/>
+            <ac:spMk id="30" creationId="{4A5D9DD3-B0F8-6F68-5D64-5D4B708FD3F9}"/>
+          </ac:spMkLst>
+        </pc:spChg>
+        <pc:spChg chg="mod">
+          <ac:chgData name="Damker, Herbert" userId="37ff36be-0e4d-42c3-ac06-7b904f0f6b24" providerId="ADAL" clId="{9610C173-2D3E-D34C-812C-51ABDB2614AF}" dt="2024-09-12T16:12:04.597" v="2655" actId="20577"/>
+          <ac:spMkLst>
+            <pc:docMk/>
+            <pc:sldMk cId="3521829536" sldId="2047"/>
+            <ac:spMk id="55" creationId="{330469DB-3A79-0753-96EE-139274EF3C86}"/>
+          </ac:spMkLst>
+        </pc:spChg>
+        <pc:spChg chg="mod">
+          <ac:chgData name="Damker, Herbert" userId="37ff36be-0e4d-42c3-ac06-7b904f0f6b24" providerId="ADAL" clId="{9610C173-2D3E-D34C-812C-51ABDB2614AF}" dt="2024-09-12T16:12:09.129" v="2657" actId="20577"/>
+          <ac:spMkLst>
+            <pc:docMk/>
+            <pc:sldMk cId="3521829536" sldId="2047"/>
+            <ac:spMk id="57" creationId="{B46FAFD5-922B-DDC9-C680-1273ED85BB12}"/>
+          </ac:spMkLst>
+        </pc:spChg>
+        <pc:spChg chg="mod">
+          <ac:chgData name="Damker, Herbert" userId="37ff36be-0e4d-42c3-ac06-7b904f0f6b24" providerId="ADAL" clId="{9610C173-2D3E-D34C-812C-51ABDB2614AF}" dt="2024-09-12T16:10:58.357" v="2635" actId="20577"/>
+          <ac:spMkLst>
+            <pc:docMk/>
+            <pc:sldMk cId="3521829536" sldId="2047"/>
+            <ac:spMk id="58" creationId="{61CB04CB-8F62-E8C8-8A05-6FDDF7E257BC}"/>
+          </ac:spMkLst>
+        </pc:spChg>
+        <pc:spChg chg="mod">
+          <ac:chgData name="Damker, Herbert" userId="37ff36be-0e4d-42c3-ac06-7b904f0f6b24" providerId="ADAL" clId="{9610C173-2D3E-D34C-812C-51ABDB2614AF}" dt="2024-09-12T16:10:30.381" v="2623" actId="20577"/>
+          <ac:spMkLst>
+            <pc:docMk/>
+            <pc:sldMk cId="3521829536" sldId="2047"/>
+            <ac:spMk id="60" creationId="{CFDEFEAE-2D07-E525-9907-10D7D2070E66}"/>
+          </ac:spMkLst>
+        </pc:spChg>
+        <pc:spChg chg="mod">
+          <ac:chgData name="Damker, Herbert" userId="37ff36be-0e4d-42c3-ac06-7b904f0f6b24" providerId="ADAL" clId="{9610C173-2D3E-D34C-812C-51ABDB2614AF}" dt="2024-09-12T16:11:46.927" v="2653" actId="20577"/>
+          <ac:spMkLst>
+            <pc:docMk/>
+            <pc:sldMk cId="3521829536" sldId="2047"/>
+            <ac:spMk id="61" creationId="{EFA2E92E-5CCC-481F-CDE7-EA0595DD343F}"/>
+          </ac:spMkLst>
+        </pc:spChg>
+        <pc:spChg chg="mod">
+          <ac:chgData name="Damker, Herbert" userId="37ff36be-0e4d-42c3-ac06-7b904f0f6b24" providerId="ADAL" clId="{9610C173-2D3E-D34C-812C-51ABDB2614AF}" dt="2024-09-12T16:09:46.836" v="2609" actId="20577"/>
+          <ac:spMkLst>
+            <pc:docMk/>
+            <pc:sldMk cId="3521829536" sldId="2047"/>
+            <ac:spMk id="62" creationId="{760D0372-935B-4706-05C8-2A4FEAE5750D}"/>
+          </ac:spMkLst>
+        </pc:spChg>
+        <pc:spChg chg="mod">
+          <ac:chgData name="Damker, Herbert" userId="37ff36be-0e4d-42c3-ac06-7b904f0f6b24" providerId="ADAL" clId="{9610C173-2D3E-D34C-812C-51ABDB2614AF}" dt="2024-09-12T16:08:41.321" v="2599" actId="20577"/>
           <ac:spMkLst>
             <pc:docMk/>
             <pc:sldMk cId="3521829536" sldId="2047"/>
@@ -1158,13 +1237,13 @@
         </pc:spChg>
       </pc:sldChg>
       <pc:sldChg chg="addSp delSp modSp mod modShow">
-        <pc:chgData name="Damker, Herbert" userId="37ff36be-0e4d-42c3-ac06-7b904f0f6b24" providerId="ADAL" clId="{9610C173-2D3E-D34C-812C-51ABDB2614AF}" dt="2024-09-11T17:11:22.074" v="2240" actId="729"/>
+        <pc:chgData name="Damker, Herbert" userId="37ff36be-0e4d-42c3-ac06-7b904f0f6b24" providerId="ADAL" clId="{9610C173-2D3E-D34C-812C-51ABDB2614AF}" dt="2024-09-12T16:14:58.463" v="2664" actId="20577"/>
         <pc:sldMkLst>
           <pc:docMk/>
           <pc:sldMk cId="2401813771" sldId="2081"/>
         </pc:sldMkLst>
         <pc:spChg chg="mod">
-          <ac:chgData name="Damker, Herbert" userId="37ff36be-0e4d-42c3-ac06-7b904f0f6b24" providerId="ADAL" clId="{9610C173-2D3E-D34C-812C-51ABDB2614AF}" dt="2024-09-11T17:03:59.377" v="2165" actId="20577"/>
+          <ac:chgData name="Damker, Herbert" userId="37ff36be-0e4d-42c3-ac06-7b904f0f6b24" providerId="ADAL" clId="{9610C173-2D3E-D34C-812C-51ABDB2614AF}" dt="2024-09-12T16:14:58.463" v="2664" actId="20577"/>
           <ac:spMkLst>
             <pc:docMk/>
             <pc:sldMk cId="2401813771" sldId="2081"/>
@@ -8827,7 +8906,7 @@
                 <a:rPr lang="en-DE" sz="800" dirty="0">
                   <a:latin typeface="Montserrat" pitchFamily="2" charset="77"/>
                 </a:rPr>
-                <a:t>Alpha</a:t>
+                <a:t>alpha</a:t>
               </a:r>
             </a:p>
           </p:txBody>
@@ -8886,7 +8965,7 @@
                 <a:rPr lang="en-DE" dirty="0">
                   <a:latin typeface="Montserrat" pitchFamily="2" charset="77"/>
                 </a:rPr>
-                <a:t>RC</a:t>
+                <a:t>rc</a:t>
               </a:r>
             </a:p>
           </p:txBody>
@@ -8945,7 +9024,7 @@
                 <a:rPr lang="en-DE" dirty="0">
                   <a:latin typeface="Montserrat" pitchFamily="2" charset="77"/>
                 </a:rPr>
-                <a:t>RC</a:t>
+                <a:t>rc</a:t>
               </a:r>
             </a:p>
           </p:txBody>
@@ -9004,7 +9083,7 @@
                 <a:rPr lang="en-DE" sz="800" dirty="0">
                   <a:latin typeface="Montserrat" pitchFamily="2" charset="77"/>
                 </a:rPr>
-                <a:t>Alpha</a:t>
+                <a:t>alpha</a:t>
               </a:r>
             </a:p>
           </p:txBody>
@@ -9390,7 +9469,7 @@
                 </a:solidFill>
                 <a:latin typeface="Montserrat" pitchFamily="2" charset="77"/>
               </a:rPr>
-              <a:t>Definitions</a:t>
+              <a:t>definitions</a:t>
             </a:r>
           </a:p>
         </p:txBody>
@@ -9448,7 +9527,7 @@
                 </a:solidFill>
                 <a:latin typeface="Montserrat" pitchFamily="2" charset="77"/>
               </a:rPr>
-              <a:t>Definitions</a:t>
+              <a:t>definitions</a:t>
             </a:r>
           </a:p>
         </p:txBody>
@@ -9497,7 +9576,7 @@
               <a:rPr lang="en-DE" sz="1100" dirty="0">
                 <a:latin typeface="Montserrat" pitchFamily="2" charset="77"/>
               </a:rPr>
-              <a:t>Lab Implementations</a:t>
+              <a:t>Lab implementations</a:t>
             </a:r>
             <a:br>
               <a:rPr lang="en-DE" sz="1100" dirty="0">
@@ -9508,7 +9587,7 @@
               <a:rPr lang="en-DE" sz="1100" dirty="0">
                 <a:latin typeface="Montserrat" pitchFamily="2" charset="77"/>
               </a:rPr>
-              <a:t>&amp; Tests of Release </a:t>
+              <a:t>&amp; tests of release </a:t>
             </a:r>
             <a:br>
               <a:rPr lang="en-DE" sz="1100" dirty="0">
@@ -9519,7 +9598,7 @@
               <a:rPr lang="en-DE" sz="1100" dirty="0">
                 <a:latin typeface="Montserrat" pitchFamily="2" charset="77"/>
               </a:rPr>
-              <a:t>Candidates (RC)</a:t>
+              <a:t>candidates (rc)</a:t>
             </a:r>
           </a:p>
         </p:txBody>
@@ -9566,7 +9645,7 @@
               <a:rPr lang="en-DE" sz="1100" dirty="0">
                 <a:latin typeface="Montserrat" pitchFamily="2" charset="77"/>
               </a:rPr>
-              <a:t>Lab Implementations</a:t>
+              <a:t>Lab implementations</a:t>
             </a:r>
             <a:br>
               <a:rPr lang="en-DE" sz="1100" dirty="0">
@@ -9577,7 +9656,7 @@
               <a:rPr lang="en-DE" sz="1100" dirty="0">
                 <a:latin typeface="Montserrat" pitchFamily="2" charset="77"/>
               </a:rPr>
-              <a:t>&amp; Tests of Release </a:t>
+              <a:t>&amp; tests of release </a:t>
             </a:r>
             <a:br>
               <a:rPr lang="en-DE" sz="1100" dirty="0">
@@ -9588,7 +9667,7 @@
               <a:rPr lang="en-DE" sz="1100" dirty="0">
                 <a:latin typeface="Montserrat" pitchFamily="2" charset="77"/>
               </a:rPr>
-              <a:t>Candidates (RC)</a:t>
+              <a:t>candidates (rc)</a:t>
             </a:r>
           </a:p>
         </p:txBody>
@@ -9626,7 +9705,7 @@
               <a:rPr lang="en-DE" sz="1100" dirty="0">
                 <a:latin typeface="Montserrat" pitchFamily="2" charset="77"/>
               </a:rPr>
-              <a:t>Operator Production </a:t>
+              <a:t>Operator production </a:t>
             </a:r>
             <a:br>
               <a:rPr lang="en-DE" sz="1100" dirty="0">
@@ -9637,7 +9716,7 @@
               <a:rPr lang="en-DE" sz="1100" dirty="0">
                 <a:latin typeface="Montserrat" pitchFamily="2" charset="77"/>
               </a:rPr>
-              <a:t>Deployments, Certifications </a:t>
+              <a:t>deployments, certifications </a:t>
             </a:r>
             <a:br>
               <a:rPr lang="en-DE" sz="1100" dirty="0">
@@ -9648,7 +9727,7 @@
               <a:rPr lang="en-DE" sz="1100" dirty="0">
                 <a:latin typeface="Montserrat" pitchFamily="2" charset="77"/>
               </a:rPr>
-              <a:t>&amp; Channel Integrations</a:t>
+              <a:t>&amp; channel integrations</a:t>
             </a:r>
           </a:p>
           <a:p>
@@ -9698,7 +9777,7 @@
               <a:rPr lang="en-DE" sz="1100" dirty="0">
                 <a:latin typeface="Montserrat" pitchFamily="2" charset="77"/>
               </a:rPr>
-              <a:t>Operator Production </a:t>
+              <a:t>Operator production </a:t>
             </a:r>
             <a:br>
               <a:rPr lang="en-DE" sz="1100" dirty="0">
@@ -9709,7 +9788,7 @@
               <a:rPr lang="en-DE" sz="1100" dirty="0">
                 <a:latin typeface="Montserrat" pitchFamily="2" charset="77"/>
               </a:rPr>
-              <a:t>Deployments, Certifications </a:t>
+              <a:t>deployments, certifications </a:t>
             </a:r>
             <a:br>
               <a:rPr lang="en-DE" sz="1100" dirty="0">
@@ -9720,7 +9799,7 @@
               <a:rPr lang="en-DE" sz="1100" dirty="0">
                 <a:latin typeface="Montserrat" pitchFamily="2" charset="77"/>
               </a:rPr>
-              <a:t>&amp; Channel Integrations</a:t>
+              <a:t>&amp; channel integrations</a:t>
             </a:r>
           </a:p>
           <a:p>
@@ -9783,7 +9862,7 @@
               <a:rPr lang="en-US" sz="1100" dirty="0">
                 <a:latin typeface="Montserrat" pitchFamily="2" charset="77"/>
               </a:rPr>
-              <a:t>Fall Release ~ September</a:t>
+              <a:t>Fall (in September)</a:t>
             </a:r>
           </a:p>
           <a:p>
@@ -9795,7 +9874,7 @@
               <a:rPr lang="en-US" sz="1100" dirty="0">
                 <a:latin typeface="Montserrat" pitchFamily="2" charset="77"/>
               </a:rPr>
-              <a:t>Spring Release ~ March</a:t>
+              <a:t>Spring (in March)</a:t>
             </a:r>
           </a:p>
           <a:p>
@@ -15834,7 +15913,7 @@
           <a:p>
             <a:r>
               <a:rPr lang="en-US" dirty="0"/>
-              <a:t>Beyond Meta-release – </a:t>
+              <a:t>Beyond Fall24 Meta-release – </a:t>
             </a:r>
             <a:br>
               <a:rPr lang="en-US" dirty="0"/>
@@ -26328,6 +26407,15 @@
 </file>
 
 <file path=customXml/item1.xml><?xml version="1.0" encoding="utf-8"?>
+<?mso-contentType ?>
+<FormTemplates xmlns="http://schemas.microsoft.com/sharepoint/v3/contenttype/forms">
+  <Display>DocumentLibraryForm</Display>
+  <Edit>DocumentLibraryForm</Edit>
+  <New>DocumentLibraryForm</New>
+</FormTemplates>
+</file>
+
+<file path=customXml/item2.xml><?xml version="1.0" encoding="utf-8"?>
 <ct:contentTypeSchema xmlns:ct="http://schemas.microsoft.com/office/2006/metadata/contentType" xmlns:ma="http://schemas.microsoft.com/office/2006/metadata/properties/metaAttributes" ct:_="" ma:_="" ma:contentTypeName="Dokument" ma:contentTypeID="0x010100044AD662EB7A25499208DD4235E5F8D6" ma:contentTypeVersion="18" ma:contentTypeDescription="Ein neues Dokument erstellen." ma:contentTypeScope="" ma:versionID="6743b63c00ca1b836503a1e7d79de5f6">
   <xsd:schema xmlns:xsd="http://www.w3.org/2001/XMLSchema" xmlns:xs="http://www.w3.org/2001/XMLSchema" xmlns:p="http://schemas.microsoft.com/office/2006/metadata/properties" xmlns:ns2="6126070c-0864-4b03-b2dc-aab5d8c39348" xmlns:ns3="97396690-0b91-46d2-ad5a-06f45914e19c" targetNamespace="http://schemas.microsoft.com/office/2006/metadata/properties" ma:root="true" ma:fieldsID="7df0be0bc9a5654e75e7c5b6be00286d" ns2:_="" ns3:_="">
     <xsd:import namespace="6126070c-0864-4b03-b2dc-aab5d8c39348"/>
@@ -26582,15 +26670,6 @@
 </ct:contentTypeSchema>
 </file>
 
-<file path=customXml/item2.xml><?xml version="1.0" encoding="utf-8"?>
-<?mso-contentType ?>
-<FormTemplates xmlns="http://schemas.microsoft.com/sharepoint/v3/contenttype/forms">
-  <Display>DocumentLibraryForm</Display>
-  <Edit>DocumentLibraryForm</Edit>
-  <New>DocumentLibraryForm</New>
-</FormTemplates>
-</file>
-
 <file path=customXml/item3.xml><?xml version="1.0" encoding="utf-8"?>
 <p:properties xmlns:p="http://schemas.microsoft.com/office/2006/metadata/properties" xmlns:xsi="http://www.w3.org/2001/XMLSchema-instance" xmlns:pc="http://schemas.microsoft.com/office/infopath/2007/PartnerControls">
   <documentManagement>
@@ -26603,6 +26682,14 @@
 </file>
 
 <file path=customXml/itemProps1.xml><?xml version="1.0" encoding="utf-8"?>
+<ds:datastoreItem xmlns:ds="http://schemas.openxmlformats.org/officeDocument/2006/customXml" ds:itemID="{61F0326B-7C1A-45A3-8DA0-69177D7DF157}">
+  <ds:schemaRefs>
+    <ds:schemaRef ds:uri="http://schemas.microsoft.com/sharepoint/v3/contenttype/forms"/>
+  </ds:schemaRefs>
+</ds:datastoreItem>
+</file>
+
+<file path=customXml/itemProps2.xml><?xml version="1.0" encoding="utf-8"?>
 <ds:datastoreItem xmlns:ds="http://schemas.openxmlformats.org/officeDocument/2006/customXml" ds:itemID="{81D38149-AF46-4DAF-AD3C-3F9AAC0C5C05}">
   <ds:schemaRefs>
     <ds:schemaRef ds:uri="http://schemas.microsoft.com/office/2006/metadata/contentType"/>
@@ -26621,27 +26708,19 @@
 </ds:datastoreItem>
 </file>
 
-<file path=customXml/itemProps2.xml><?xml version="1.0" encoding="utf-8"?>
-<ds:datastoreItem xmlns:ds="http://schemas.openxmlformats.org/officeDocument/2006/customXml" ds:itemID="{61F0326B-7C1A-45A3-8DA0-69177D7DF157}">
-  <ds:schemaRefs>
-    <ds:schemaRef ds:uri="http://schemas.microsoft.com/sharepoint/v3/contenttype/forms"/>
-  </ds:schemaRefs>
-</ds:datastoreItem>
-</file>
-
 <file path=customXml/itemProps3.xml><?xml version="1.0" encoding="utf-8"?>
 <ds:datastoreItem xmlns:ds="http://schemas.openxmlformats.org/officeDocument/2006/customXml" ds:itemID="{5CDA25CC-4121-470E-8B41-1BE7874AB2F0}">
   <ds:schemaRefs>
+    <ds:schemaRef ds:uri="http://purl.org/dc/terms/"/>
+    <ds:schemaRef ds:uri="http://schemas.microsoft.com/office/infopath/2007/PartnerControls"/>
+    <ds:schemaRef ds:uri="http://purl.org/dc/elements/1.1/"/>
+    <ds:schemaRef ds:uri="http://schemas.microsoft.com/office/2006/metadata/properties"/>
+    <ds:schemaRef ds:uri="http://purl.org/dc/dcmitype/"/>
+    <ds:schemaRef ds:uri="http://schemas.microsoft.com/office/2006/documentManagement/types"/>
+    <ds:schemaRef ds:uri="http://schemas.openxmlformats.org/package/2006/metadata/core-properties"/>
+    <ds:schemaRef ds:uri="97396690-0b91-46d2-ad5a-06f45914e19c"/>
     <ds:schemaRef ds:uri="6126070c-0864-4b03-b2dc-aab5d8c39348"/>
-    <ds:schemaRef ds:uri="http://schemas.microsoft.com/office/2006/metadata/properties"/>
-    <ds:schemaRef ds:uri="http://schemas.microsoft.com/office/2006/documentManagement/types"/>
-    <ds:schemaRef ds:uri="97396690-0b91-46d2-ad5a-06f45914e19c"/>
     <ds:schemaRef ds:uri="http://www.w3.org/XML/1998/namespace"/>
-    <ds:schemaRef ds:uri="http://purl.org/dc/elements/1.1/"/>
-    <ds:schemaRef ds:uri="http://purl.org/dc/dcmitype/"/>
-    <ds:schemaRef ds:uri="http://schemas.microsoft.com/office/infopath/2007/PartnerControls"/>
-    <ds:schemaRef ds:uri="http://schemas.openxmlformats.org/package/2006/metadata/core-properties"/>
-    <ds:schemaRef ds:uri="http://purl.org/dc/terms/"/>
   </ds:schemaRefs>
 </ds:datastoreItem>
 </file>

</xml_diff>

<commit_message>
Updated versions - "meta-release" corrected
always "meta-release" except in heading or at start of sentence.
</commit_message>
<xml_diff>
--- a/documentation/SupportingDocuments/CAMARA Meta-release Fall24.pptx
+++ b/documentation/SupportingDocuments/CAMARA Meta-release Fall24.pptx
@@ -268,7 +268,7 @@
 <file path=ppt/revisionInfo.xml><?xml version="1.0" encoding="utf-8"?>
 <p1510:revInfo xmlns:a="http://schemas.openxmlformats.org/drawingml/2006/main" xmlns:r="http://schemas.openxmlformats.org/officeDocument/2006/relationships" xmlns:p1510="http://schemas.microsoft.com/office/powerpoint/2015/10/main">
   <p1510:revLst>
-    <p1510:client id="{9610C173-2D3E-D34C-812C-51ABDB2614AF}" v="1843" dt="2024-09-11T19:00:20.238"/>
+    <p1510:client id="{9610C173-2D3E-D34C-812C-51ABDB2614AF}" v="2" dt="2024-09-13T06:42:22.294"/>
   </p1510:revLst>
 </p1510:revInfo>
 </file>
@@ -276,9 +276,56 @@
 <file path=ppt/changesInfos/changesInfo1.xml><?xml version="1.0" encoding="utf-8"?>
 <pc:chgInfo xmlns:a="http://schemas.openxmlformats.org/drawingml/2006/main" xmlns:r="http://schemas.openxmlformats.org/officeDocument/2006/relationships" xmlns:ac="http://schemas.microsoft.com/office/drawing/2013/main/command" xmlns:pc="http://schemas.microsoft.com/office/powerpoint/2013/main/command">
   <pc:docChgLst>
+    <pc:chgData name="Kümmerle, Markus" userId="edb588ad-b118-44cb-93b6-335b967c9009" providerId="ADAL" clId="{2F0FF740-952C-4C74-882C-C4254FB9DD08}"/>
+    <pc:docChg chg="modSld">
+      <pc:chgData name="Kümmerle, Markus" userId="edb588ad-b118-44cb-93b6-335b967c9009" providerId="ADAL" clId="{2F0FF740-952C-4C74-882C-C4254FB9DD08}" dt="2024-09-13T06:14:49.856" v="7" actId="20577"/>
+      <pc:docMkLst>
+        <pc:docMk/>
+      </pc:docMkLst>
+      <pc:sldChg chg="modSp mod">
+        <pc:chgData name="Kümmerle, Markus" userId="edb588ad-b118-44cb-93b6-335b967c9009" providerId="ADAL" clId="{2F0FF740-952C-4C74-882C-C4254FB9DD08}" dt="2024-09-13T06:14:49.856" v="7" actId="20577"/>
+        <pc:sldMkLst>
+          <pc:docMk/>
+          <pc:sldMk cId="1652484770" sldId="2044"/>
+        </pc:sldMkLst>
+        <pc:spChg chg="mod">
+          <ac:chgData name="Kümmerle, Markus" userId="edb588ad-b118-44cb-93b6-335b967c9009" providerId="ADAL" clId="{2F0FF740-952C-4C74-882C-C4254FB9DD08}" dt="2024-09-13T06:14:49.856" v="7" actId="20577"/>
+          <ac:spMkLst>
+            <pc:docMk/>
+            <pc:sldMk cId="1652484770" sldId="2044"/>
+            <ac:spMk id="7" creationId="{C1CBEC6C-A35E-B413-C2F0-A045C556DBD2}"/>
+          </ac:spMkLst>
+        </pc:spChg>
+      </pc:sldChg>
+      <pc:sldChg chg="modSp mod">
+        <pc:chgData name="Kümmerle, Markus" userId="edb588ad-b118-44cb-93b6-335b967c9009" providerId="ADAL" clId="{2F0FF740-952C-4C74-882C-C4254FB9DD08}" dt="2024-09-13T06:13:24.281" v="3" actId="20577"/>
+        <pc:sldMkLst>
+          <pc:docMk/>
+          <pc:sldMk cId="3521829536" sldId="2047"/>
+        </pc:sldMkLst>
+        <pc:spChg chg="mod">
+          <ac:chgData name="Kümmerle, Markus" userId="edb588ad-b118-44cb-93b6-335b967c9009" providerId="ADAL" clId="{2F0FF740-952C-4C74-882C-C4254FB9DD08}" dt="2024-09-13T06:13:24.281" v="3" actId="20577"/>
+          <ac:spMkLst>
+            <pc:docMk/>
+            <pc:sldMk cId="3521829536" sldId="2047"/>
+            <ac:spMk id="61" creationId="{EFA2E92E-5CCC-481F-CDE7-EA0595DD343F}"/>
+          </ac:spMkLst>
+        </pc:spChg>
+        <pc:spChg chg="mod">
+          <ac:chgData name="Kümmerle, Markus" userId="edb588ad-b118-44cb-93b6-335b967c9009" providerId="ADAL" clId="{2F0FF740-952C-4C74-882C-C4254FB9DD08}" dt="2024-09-13T06:13:19.730" v="1" actId="20577"/>
+          <ac:spMkLst>
+            <pc:docMk/>
+            <pc:sldMk cId="3521829536" sldId="2047"/>
+            <ac:spMk id="62" creationId="{760D0372-935B-4706-05C8-2A4FEAE5750D}"/>
+          </ac:spMkLst>
+        </pc:spChg>
+      </pc:sldChg>
+    </pc:docChg>
+  </pc:docChgLst>
+  <pc:docChgLst>
     <pc:chgData name="Damker, Herbert" userId="37ff36be-0e4d-42c3-ac06-7b904f0f6b24" providerId="ADAL" clId="{9610C173-2D3E-D34C-812C-51ABDB2614AF}"/>
     <pc:docChg chg="undo custSel addSld delSld modSld sldOrd modSection">
-      <pc:chgData name="Damker, Herbert" userId="37ff36be-0e4d-42c3-ac06-7b904f0f6b24" providerId="ADAL" clId="{9610C173-2D3E-D34C-812C-51ABDB2614AF}" dt="2024-09-12T16:14:58.463" v="2664" actId="20577"/>
+      <pc:chgData name="Damker, Herbert" userId="37ff36be-0e4d-42c3-ac06-7b904f0f6b24" providerId="ADAL" clId="{9610C173-2D3E-D34C-812C-51ABDB2614AF}" dt="2024-09-13T06:45:09.660" v="2706" actId="20577"/>
       <pc:docMkLst>
         <pc:docMk/>
       </pc:docMkLst>
@@ -666,13 +713,13 @@
         </pc:picChg>
       </pc:sldChg>
       <pc:sldChg chg="modSp mod">
-        <pc:chgData name="Damker, Herbert" userId="37ff36be-0e4d-42c3-ac06-7b904f0f6b24" providerId="ADAL" clId="{9610C173-2D3E-D34C-812C-51ABDB2614AF}" dt="2024-09-11T18:02:34.227" v="2278" actId="20577"/>
+        <pc:chgData name="Damker, Herbert" userId="37ff36be-0e4d-42c3-ac06-7b904f0f6b24" providerId="ADAL" clId="{9610C173-2D3E-D34C-812C-51ABDB2614AF}" dt="2024-09-13T06:45:09.660" v="2706" actId="20577"/>
         <pc:sldMkLst>
           <pc:docMk/>
           <pc:sldMk cId="1652484770" sldId="2044"/>
         </pc:sldMkLst>
         <pc:spChg chg="mod">
-          <ac:chgData name="Damker, Herbert" userId="37ff36be-0e4d-42c3-ac06-7b904f0f6b24" providerId="ADAL" clId="{9610C173-2D3E-D34C-812C-51ABDB2614AF}" dt="2024-09-11T18:02:34.227" v="2278" actId="20577"/>
+          <ac:chgData name="Damker, Herbert" userId="37ff36be-0e4d-42c3-ac06-7b904f0f6b24" providerId="ADAL" clId="{9610C173-2D3E-D34C-812C-51ABDB2614AF}" dt="2024-09-13T06:45:09.660" v="2706" actId="20577"/>
           <ac:spMkLst>
             <pc:docMk/>
             <pc:sldMk cId="1652484770" sldId="2044"/>
@@ -704,7 +751,7 @@
         </pc:spChg>
       </pc:sldChg>
       <pc:sldChg chg="modSp mod">
-        <pc:chgData name="Damker, Herbert" userId="37ff36be-0e4d-42c3-ac06-7b904f0f6b24" providerId="ADAL" clId="{9610C173-2D3E-D34C-812C-51ABDB2614AF}" dt="2024-09-12T16:12:09.129" v="2657" actId="20577"/>
+        <pc:chgData name="Damker, Herbert" userId="37ff36be-0e4d-42c3-ac06-7b904f0f6b24" providerId="ADAL" clId="{9610C173-2D3E-D34C-812C-51ABDB2614AF}" dt="2024-09-13T06:43:44.627" v="2694" actId="20577"/>
         <pc:sldMkLst>
           <pc:docMk/>
           <pc:sldMk cId="3521829536" sldId="2047"/>
@@ -726,7 +773,7 @@
           </ac:spMkLst>
         </pc:spChg>
         <pc:spChg chg="mod">
-          <ac:chgData name="Damker, Herbert" userId="37ff36be-0e4d-42c3-ac06-7b904f0f6b24" providerId="ADAL" clId="{9610C173-2D3E-D34C-812C-51ABDB2614AF}" dt="2024-09-11T16:58:20.026" v="2025" actId="27636"/>
+          <ac:chgData name="Damker, Herbert" userId="37ff36be-0e4d-42c3-ac06-7b904f0f6b24" providerId="ADAL" clId="{9610C173-2D3E-D34C-812C-51ABDB2614AF}" dt="2024-09-13T06:43:13.081" v="2690" actId="20577"/>
           <ac:spMkLst>
             <pc:docMk/>
             <pc:sldMk cId="3521829536" sldId="2047"/>
@@ -734,7 +781,7 @@
           </ac:spMkLst>
         </pc:spChg>
         <pc:spChg chg="mod">
-          <ac:chgData name="Damker, Herbert" userId="37ff36be-0e4d-42c3-ac06-7b904f0f6b24" providerId="ADAL" clId="{9610C173-2D3E-D34C-812C-51ABDB2614AF}" dt="2024-09-11T16:58:04.307" v="2016" actId="27636"/>
+          <ac:chgData name="Damker, Herbert" userId="37ff36be-0e4d-42c3-ac06-7b904f0f6b24" providerId="ADAL" clId="{9610C173-2D3E-D34C-812C-51ABDB2614AF}" dt="2024-09-13T06:43:06.998" v="2688" actId="27636"/>
           <ac:spMkLst>
             <pc:docMk/>
             <pc:sldMk cId="3521829536" sldId="2047"/>
@@ -790,7 +837,7 @@
           </ac:spMkLst>
         </pc:spChg>
         <pc:spChg chg="mod">
-          <ac:chgData name="Damker, Herbert" userId="37ff36be-0e4d-42c3-ac06-7b904f0f6b24" providerId="ADAL" clId="{9610C173-2D3E-D34C-812C-51ABDB2614AF}" dt="2024-09-12T16:11:46.927" v="2653" actId="20577"/>
+          <ac:chgData name="Damker, Herbert" userId="37ff36be-0e4d-42c3-ac06-7b904f0f6b24" providerId="ADAL" clId="{9610C173-2D3E-D34C-812C-51ABDB2614AF}" dt="2024-09-13T06:43:40.090" v="2692" actId="20577"/>
           <ac:spMkLst>
             <pc:docMk/>
             <pc:sldMk cId="3521829536" sldId="2047"/>
@@ -798,7 +845,7 @@
           </ac:spMkLst>
         </pc:spChg>
         <pc:spChg chg="mod">
-          <ac:chgData name="Damker, Herbert" userId="37ff36be-0e4d-42c3-ac06-7b904f0f6b24" providerId="ADAL" clId="{9610C173-2D3E-D34C-812C-51ABDB2614AF}" dt="2024-09-12T16:09:46.836" v="2609" actId="20577"/>
+          <ac:chgData name="Damker, Herbert" userId="37ff36be-0e4d-42c3-ac06-7b904f0f6b24" providerId="ADAL" clId="{9610C173-2D3E-D34C-812C-51ABDB2614AF}" dt="2024-09-13T06:43:44.627" v="2694" actId="20577"/>
           <ac:spMkLst>
             <pc:docMk/>
             <pc:sldMk cId="3521829536" sldId="2047"/>
@@ -1237,13 +1284,13 @@
         </pc:spChg>
       </pc:sldChg>
       <pc:sldChg chg="addSp delSp modSp mod modShow">
-        <pc:chgData name="Damker, Herbert" userId="37ff36be-0e4d-42c3-ac06-7b904f0f6b24" providerId="ADAL" clId="{9610C173-2D3E-D34C-812C-51ABDB2614AF}" dt="2024-09-12T16:14:58.463" v="2664" actId="20577"/>
+        <pc:chgData name="Damker, Herbert" userId="37ff36be-0e4d-42c3-ac06-7b904f0f6b24" providerId="ADAL" clId="{9610C173-2D3E-D34C-812C-51ABDB2614AF}" dt="2024-09-13T06:44:18.218" v="2698" actId="20577"/>
         <pc:sldMkLst>
           <pc:docMk/>
           <pc:sldMk cId="2401813771" sldId="2081"/>
         </pc:sldMkLst>
         <pc:spChg chg="mod">
-          <ac:chgData name="Damker, Herbert" userId="37ff36be-0e4d-42c3-ac06-7b904f0f6b24" providerId="ADAL" clId="{9610C173-2D3E-D34C-812C-51ABDB2614AF}" dt="2024-09-12T16:14:58.463" v="2664" actId="20577"/>
+          <ac:chgData name="Damker, Herbert" userId="37ff36be-0e4d-42c3-ac06-7b904f0f6b24" providerId="ADAL" clId="{9610C173-2D3E-D34C-812C-51ABDB2614AF}" dt="2024-09-13T06:44:18.218" v="2698" actId="20577"/>
           <ac:spMkLst>
             <pc:docMk/>
             <pc:sldMk cId="2401813771" sldId="2081"/>
@@ -2213,7 +2260,7 @@
             <a:fld id="{9847C1C0-7CF7-4E43-8415-72BC7E37BCB3}" type="datetimeFigureOut">
               <a:rPr lang="de-DE" smtClean="0"/>
               <a:pPr/>
-              <a:t>12.09.24</a:t>
+              <a:t>13.09.24</a:t>
             </a:fld>
             <a:endParaRPr lang="de-DE"/>
           </a:p>
@@ -7895,7 +7942,12 @@
             <p:ph sz="quarter" idx="10"/>
           </p:nvPr>
         </p:nvSpPr>
-        <p:spPr/>
+        <p:spPr>
+          <a:xfrm>
+            <a:off x="428045" y="1890346"/>
+            <a:ext cx="10944225" cy="4124383"/>
+          </a:xfrm>
+        </p:spPr>
         <p:txBody>
           <a:bodyPr/>
           <a:lstStyle/>
@@ -7912,7 +7964,7 @@
               <a:rPr lang="en-US" sz="1600" dirty="0">
                 <a:latin typeface="Montserrat SemiBold" panose="00000700000000000000" pitchFamily="2" charset="0"/>
               </a:rPr>
-              <a:t>CAMARA Meta-release </a:t>
+              <a:t>CAMARA meta-release </a:t>
             </a:r>
             <a:r>
               <a:rPr lang="en-US" sz="1600" dirty="0"/>
@@ -8005,10 +8057,10 @@
               <a:buChar char="•"/>
             </a:pPr>
             <a:r>
-              <a:rPr lang="en-US" sz="1600" dirty="0">
+              <a:rPr lang="en-US" sz="1600">
                 <a:latin typeface="Montserrat SemiBold" panose="00000700000000000000" pitchFamily="2" charset="0"/>
               </a:rPr>
-              <a:t>CAMARA Meta-releases </a:t>
+              <a:t>CAMARA meta-releases </a:t>
             </a:r>
             <a:r>
               <a:rPr lang="en-US" sz="1600" dirty="0"/>
@@ -8064,7 +8116,7 @@
               <a:rPr lang="en-US" sz="1600" dirty="0">
                 <a:latin typeface="Montserrat SemiBold" panose="00000700000000000000" pitchFamily="2" charset="0"/>
               </a:rPr>
-              <a:t>CAMARA Meta-releases </a:t>
+              <a:t>CAMARA meta-releases </a:t>
             </a:r>
             <a:r>
               <a:rPr lang="en-US" sz="1600" dirty="0"/>
@@ -8734,7 +8786,7 @@
                   </a:solidFill>
                   <a:latin typeface="Montserrat" pitchFamily="2" charset="77"/>
                 </a:rPr>
-                <a:t>Meta-</a:t>
+                <a:t>meta-</a:t>
               </a:r>
               <a:br>
                 <a:rPr lang="en-DE" sz="1100" dirty="0">
@@ -8830,7 +8882,7 @@
                   </a:solidFill>
                   <a:latin typeface="Montserrat" pitchFamily="2" charset="77"/>
                 </a:rPr>
-                <a:t>Meta-</a:t>
+                <a:t>meta-</a:t>
               </a:r>
               <a:br>
                 <a:rPr lang="en-DE" sz="1100" dirty="0">
@@ -9686,8 +9738,8 @@
         </p:nvSpPr>
         <p:spPr>
           <a:xfrm>
-            <a:off x="9108376" y="5077821"/>
-            <a:ext cx="2286203" cy="769441"/>
+            <a:off x="9124406" y="5077821"/>
+            <a:ext cx="2254143" cy="769441"/>
           </a:xfrm>
           <a:prstGeom prst="rect">
             <a:avLst/>
@@ -9736,7 +9788,13 @@
               <a:rPr lang="en-GB" sz="1100" dirty="0">
                 <a:latin typeface="Montserrat" pitchFamily="2" charset="77"/>
               </a:rPr>
-              <a:t>of CAMARA Fall Meta-Release</a:t>
+              <a:t>of CAMARA </a:t>
+            </a:r>
+            <a:r>
+              <a:rPr lang="en-GB" sz="1100">
+                <a:latin typeface="Montserrat" pitchFamily="2" charset="77"/>
+              </a:rPr>
+              <a:t>Fall meta-release</a:t>
             </a:r>
             <a:endParaRPr lang="en-DE" sz="1100" dirty="0">
               <a:latin typeface="Montserrat" pitchFamily="2" charset="77"/>
@@ -9758,8 +9816,8 @@
         </p:nvSpPr>
         <p:spPr>
           <a:xfrm>
-            <a:off x="3835249" y="1408489"/>
-            <a:ext cx="2505814" cy="769441"/>
+            <a:off x="3851279" y="1408489"/>
+            <a:ext cx="2473755" cy="769441"/>
           </a:xfrm>
           <a:prstGeom prst="rect">
             <a:avLst/>
@@ -9808,7 +9866,13 @@
               <a:rPr lang="en-GB" sz="1100" dirty="0">
                 <a:latin typeface="Montserrat" pitchFamily="2" charset="77"/>
               </a:rPr>
-              <a:t>of CAMARA Spring Meta-Release</a:t>
+              <a:t>of CAMARA </a:t>
+            </a:r>
+            <a:r>
+              <a:rPr lang="en-GB" sz="1100">
+                <a:latin typeface="Montserrat" pitchFamily="2" charset="77"/>
+              </a:rPr>
+              <a:t>Spring meta-release</a:t>
             </a:r>
             <a:endParaRPr lang="en-DE" sz="1100" dirty="0">
               <a:latin typeface="Montserrat" pitchFamily="2" charset="77"/>
@@ -15913,14 +15977,14 @@
           <a:p>
             <a:r>
               <a:rPr lang="en-US" dirty="0"/>
-              <a:t>Beyond Fall24 Meta-release – </a:t>
+              <a:t>Beyond Fall24 Meta-release </a:t>
             </a:r>
             <a:br>
               <a:rPr lang="en-US" dirty="0"/>
             </a:br>
             <a:r>
               <a:rPr lang="en-US" dirty="0"/>
-              <a:t>Upcoming APIs</a:t>
+              <a:t>– Upcoming APIs</a:t>
             </a:r>
           </a:p>
         </p:txBody>
@@ -26407,15 +26471,6 @@
 </file>
 
 <file path=customXml/item1.xml><?xml version="1.0" encoding="utf-8"?>
-<?mso-contentType ?>
-<FormTemplates xmlns="http://schemas.microsoft.com/sharepoint/v3/contenttype/forms">
-  <Display>DocumentLibraryForm</Display>
-  <Edit>DocumentLibraryForm</Edit>
-  <New>DocumentLibraryForm</New>
-</FormTemplates>
-</file>
-
-<file path=customXml/item2.xml><?xml version="1.0" encoding="utf-8"?>
 <ct:contentTypeSchema xmlns:ct="http://schemas.microsoft.com/office/2006/metadata/contentType" xmlns:ma="http://schemas.microsoft.com/office/2006/metadata/properties/metaAttributes" ct:_="" ma:_="" ma:contentTypeName="Dokument" ma:contentTypeID="0x010100044AD662EB7A25499208DD4235E5F8D6" ma:contentTypeVersion="18" ma:contentTypeDescription="Ein neues Dokument erstellen." ma:contentTypeScope="" ma:versionID="6743b63c00ca1b836503a1e7d79de5f6">
   <xsd:schema xmlns:xsd="http://www.w3.org/2001/XMLSchema" xmlns:xs="http://www.w3.org/2001/XMLSchema" xmlns:p="http://schemas.microsoft.com/office/2006/metadata/properties" xmlns:ns2="6126070c-0864-4b03-b2dc-aab5d8c39348" xmlns:ns3="97396690-0b91-46d2-ad5a-06f45914e19c" targetNamespace="http://schemas.microsoft.com/office/2006/metadata/properties" ma:root="true" ma:fieldsID="7df0be0bc9a5654e75e7c5b6be00286d" ns2:_="" ns3:_="">
     <xsd:import namespace="6126070c-0864-4b03-b2dc-aab5d8c39348"/>
@@ -26670,6 +26725,15 @@
 </ct:contentTypeSchema>
 </file>
 
+<file path=customXml/item2.xml><?xml version="1.0" encoding="utf-8"?>
+<?mso-contentType ?>
+<FormTemplates xmlns="http://schemas.microsoft.com/sharepoint/v3/contenttype/forms">
+  <Display>DocumentLibraryForm</Display>
+  <Edit>DocumentLibraryForm</Edit>
+  <New>DocumentLibraryForm</New>
+</FormTemplates>
+</file>
+
 <file path=customXml/item3.xml><?xml version="1.0" encoding="utf-8"?>
 <p:properties xmlns:p="http://schemas.microsoft.com/office/2006/metadata/properties" xmlns:xsi="http://www.w3.org/2001/XMLSchema-instance" xmlns:pc="http://schemas.microsoft.com/office/infopath/2007/PartnerControls">
   <documentManagement>
@@ -26682,14 +26746,6 @@
 </file>
 
 <file path=customXml/itemProps1.xml><?xml version="1.0" encoding="utf-8"?>
-<ds:datastoreItem xmlns:ds="http://schemas.openxmlformats.org/officeDocument/2006/customXml" ds:itemID="{61F0326B-7C1A-45A3-8DA0-69177D7DF157}">
-  <ds:schemaRefs>
-    <ds:schemaRef ds:uri="http://schemas.microsoft.com/sharepoint/v3/contenttype/forms"/>
-  </ds:schemaRefs>
-</ds:datastoreItem>
-</file>
-
-<file path=customXml/itemProps2.xml><?xml version="1.0" encoding="utf-8"?>
 <ds:datastoreItem xmlns:ds="http://schemas.openxmlformats.org/officeDocument/2006/customXml" ds:itemID="{81D38149-AF46-4DAF-AD3C-3F9AAC0C5C05}">
   <ds:schemaRefs>
     <ds:schemaRef ds:uri="http://schemas.microsoft.com/office/2006/metadata/contentType"/>
@@ -26708,19 +26764,27 @@
 </ds:datastoreItem>
 </file>
 
+<file path=customXml/itemProps2.xml><?xml version="1.0" encoding="utf-8"?>
+<ds:datastoreItem xmlns:ds="http://schemas.openxmlformats.org/officeDocument/2006/customXml" ds:itemID="{61F0326B-7C1A-45A3-8DA0-69177D7DF157}">
+  <ds:schemaRefs>
+    <ds:schemaRef ds:uri="http://schemas.microsoft.com/sharepoint/v3/contenttype/forms"/>
+  </ds:schemaRefs>
+</ds:datastoreItem>
+</file>
+
 <file path=customXml/itemProps3.xml><?xml version="1.0" encoding="utf-8"?>
 <ds:datastoreItem xmlns:ds="http://schemas.openxmlformats.org/officeDocument/2006/customXml" ds:itemID="{5CDA25CC-4121-470E-8B41-1BE7874AB2F0}">
   <ds:schemaRefs>
-    <ds:schemaRef ds:uri="http://purl.org/dc/terms/"/>
-    <ds:schemaRef ds:uri="http://schemas.microsoft.com/office/infopath/2007/PartnerControls"/>
+    <ds:schemaRef ds:uri="97396690-0b91-46d2-ad5a-06f45914e19c"/>
     <ds:schemaRef ds:uri="http://purl.org/dc/elements/1.1/"/>
     <ds:schemaRef ds:uri="http://schemas.microsoft.com/office/2006/metadata/properties"/>
+    <ds:schemaRef ds:uri="http://www.w3.org/XML/1998/namespace"/>
+    <ds:schemaRef ds:uri="http://schemas.microsoft.com/office/infopath/2007/PartnerControls"/>
+    <ds:schemaRef ds:uri="http://purl.org/dc/terms/"/>
     <ds:schemaRef ds:uri="http://purl.org/dc/dcmitype/"/>
     <ds:schemaRef ds:uri="http://schemas.microsoft.com/office/2006/documentManagement/types"/>
     <ds:schemaRef ds:uri="http://schemas.openxmlformats.org/package/2006/metadata/core-properties"/>
-    <ds:schemaRef ds:uri="97396690-0b91-46d2-ad5a-06f45914e19c"/>
     <ds:schemaRef ds:uri="6126070c-0864-4b03-b2dc-aab5d8c39348"/>
-    <ds:schemaRef ds:uri="http://www.w3.org/XML/1998/namespace"/>
   </ds:schemaRefs>
 </ds:datastoreItem>
 </file>

</xml_diff>